<commit_message>
Added Excel spreadsheet as an example of how the resource management problem is currently solved in many organisations. Our app implementation will streamline this process, make it more intuitive, and provide better distribution/collaboration.
</commit_message>
<xml_diff>
--- a/ResourceManagementPresentation.pptx
+++ b/ResourceManagementPresentation.pptx
@@ -8,11 +8,13 @@
     <p:sldId id="256" r:id="rId2"/>
     <p:sldId id="257" r:id="rId3"/>
     <p:sldId id="258" r:id="rId4"/>
-    <p:sldId id="259" r:id="rId5"/>
-    <p:sldId id="260" r:id="rId6"/>
-    <p:sldId id="261" r:id="rId7"/>
-    <p:sldId id="262" r:id="rId8"/>
-    <p:sldId id="263" r:id="rId9"/>
+    <p:sldId id="264" r:id="rId5"/>
+    <p:sldId id="259" r:id="rId6"/>
+    <p:sldId id="260" r:id="rId7"/>
+    <p:sldId id="266" r:id="rId8"/>
+    <p:sldId id="261" r:id="rId9"/>
+    <p:sldId id="262" r:id="rId10"/>
+    <p:sldId id="263" r:id="rId11"/>
   </p:sldIdLst>
   <p:sldSz cx="12192000" cy="6858000"/>
   <p:notesSz cx="6858000" cy="9144000"/>
@@ -111,6 +113,11 @@
       </a:defRPr>
     </a:lvl9pPr>
   </p:defaultTextStyle>
+  <p:extLst>
+    <p:ext uri="{EFAFB233-063F-42B5-8137-9DF3F51BA10A}">
+      <p15:sldGuideLst xmlns:p15="http://schemas.microsoft.com/office/powerpoint/2012/main"/>
+    </p:ext>
+  </p:extLst>
 </p:presentation>
 </file>
 
@@ -5390,6 +5397,118 @@
 </p:sld>
 </file>
 
+<file path=ppt/slides/slide10.xml><?xml version="1.0" encoding="utf-8"?>
+<p:sld xmlns:a="http://schemas.openxmlformats.org/drawingml/2006/main" xmlns:r="http://schemas.openxmlformats.org/officeDocument/2006/relationships" xmlns:p="http://schemas.openxmlformats.org/presentationml/2006/main">
+  <p:cSld>
+    <p:spTree>
+      <p:nvGrpSpPr>
+        <p:cNvPr id="1" name=""/>
+        <p:cNvGrpSpPr/>
+        <p:nvPr/>
+      </p:nvGrpSpPr>
+      <p:grpSpPr>
+        <a:xfrm>
+          <a:off x="0" y="0"/>
+          <a:ext cx="0" cy="0"/>
+          <a:chOff x="0" y="0"/>
+          <a:chExt cx="0" cy="0"/>
+        </a:xfrm>
+      </p:grpSpPr>
+      <p:sp>
+        <p:nvSpPr>
+          <p:cNvPr id="2" name="Title 1"/>
+          <p:cNvSpPr>
+            <a:spLocks noGrp="1"/>
+          </p:cNvSpPr>
+          <p:nvPr>
+            <p:ph type="title"/>
+          </p:nvPr>
+        </p:nvSpPr>
+        <p:spPr>
+          <a:xfrm>
+            <a:off x="684212" y="368486"/>
+            <a:ext cx="8534400" cy="1507067"/>
+          </a:xfrm>
+        </p:spPr>
+        <p:txBody>
+          <a:bodyPr/>
+          <a:lstStyle/>
+          <a:p>
+            <a:r>
+              <a:rPr lang="en-US" dirty="0" smtClean="0"/>
+              <a:t>Schedule</a:t>
+            </a:r>
+            <a:endParaRPr lang="en-AU" dirty="0"/>
+          </a:p>
+        </p:txBody>
+      </p:sp>
+      <p:sp>
+        <p:nvSpPr>
+          <p:cNvPr id="3" name="Content Placeholder 2"/>
+          <p:cNvSpPr>
+            <a:spLocks noGrp="1"/>
+          </p:cNvSpPr>
+          <p:nvPr>
+            <p:ph idx="1"/>
+          </p:nvPr>
+        </p:nvSpPr>
+        <p:spPr>
+          <a:xfrm>
+            <a:off x="684212" y="2215195"/>
+            <a:ext cx="8534400" cy="3615267"/>
+          </a:xfrm>
+        </p:spPr>
+        <p:txBody>
+          <a:bodyPr>
+            <a:normAutofit/>
+          </a:bodyPr>
+          <a:lstStyle/>
+          <a:p>
+            <a:r>
+              <a:rPr lang="en-US" dirty="0" smtClean="0"/>
+              <a:t>Identify </a:t>
+            </a:r>
+            <a:r>
+              <a:rPr lang="en-US" dirty="0"/>
+              <a:t>the major milestones of the project </a:t>
+            </a:r>
+          </a:p>
+          <a:p>
+            <a:r>
+              <a:rPr lang="en-US" dirty="0" smtClean="0"/>
+              <a:t>Indicate </a:t>
+            </a:r>
+            <a:r>
+              <a:rPr lang="en-US" dirty="0"/>
+              <a:t>when each milestone should be </a:t>
+            </a:r>
+            <a:r>
+              <a:rPr lang="en-US" dirty="0" smtClean="0"/>
+              <a:t>achieved</a:t>
+            </a:r>
+          </a:p>
+          <a:p>
+            <a:r>
+              <a:rPr lang="en-US" dirty="0" smtClean="0"/>
+              <a:t>Gantt Chart</a:t>
+            </a:r>
+            <a:endParaRPr lang="en-US" dirty="0"/>
+          </a:p>
+        </p:txBody>
+      </p:sp>
+    </p:spTree>
+    <p:extLst>
+      <p:ext uri="{BB962C8B-B14F-4D97-AF65-F5344CB8AC3E}">
+        <p14:creationId xmlns:p14="http://schemas.microsoft.com/office/powerpoint/2010/main" val="1030416648"/>
+      </p:ext>
+    </p:extLst>
+  </p:cSld>
+  <p:clrMapOvr>
+    <a:masterClrMapping/>
+  </p:clrMapOvr>
+</p:sld>
+</file>
+
 <file path=ppt/slides/slide2.xml><?xml version="1.0" encoding="utf-8"?>
 <p:sld xmlns:a="http://schemas.openxmlformats.org/drawingml/2006/main" xmlns:r="http://schemas.openxmlformats.org/officeDocument/2006/relationships" xmlns:p="http://schemas.openxmlformats.org/presentationml/2006/main">
   <p:cSld>
@@ -5666,90 +5785,33 @@
           <a:chExt cx="0" cy="0"/>
         </a:xfrm>
       </p:grpSpPr>
-      <p:sp>
-        <p:nvSpPr>
-          <p:cNvPr id="2" name="Title 1"/>
-          <p:cNvSpPr>
-            <a:spLocks noGrp="1"/>
-          </p:cNvSpPr>
-          <p:nvPr>
-            <p:ph type="title"/>
-          </p:nvPr>
-        </p:nvSpPr>
+      <p:pic>
+        <p:nvPicPr>
+          <p:cNvPr id="4" name="Picture 3"/>
+          <p:cNvPicPr>
+            <a:picLocks noChangeAspect="1"/>
+          </p:cNvPicPr>
+          <p:nvPr/>
+        </p:nvPicPr>
+        <p:blipFill rotWithShape="1">
+          <a:blip r:embed="rId2"/>
+          <a:srcRect l="10555" t="18642" r="16287" b="9542"/>
+          <a:stretch/>
+        </p:blipFill>
         <p:spPr>
           <a:xfrm>
-            <a:off x="684212" y="368486"/>
-            <a:ext cx="8534400" cy="1507067"/>
+            <a:off x="917268" y="657225"/>
+            <a:ext cx="10393936" cy="5739492"/>
           </a:xfrm>
+          <a:prstGeom prst="rect">
+            <a:avLst/>
+          </a:prstGeom>
         </p:spPr>
-        <p:txBody>
-          <a:bodyPr/>
-          <a:lstStyle/>
-          <a:p>
-            <a:r>
-              <a:rPr lang="en-US" dirty="0" smtClean="0"/>
-              <a:t>Audience</a:t>
-            </a:r>
-            <a:endParaRPr lang="en-AU" dirty="0"/>
-          </a:p>
-        </p:txBody>
-      </p:sp>
-      <p:sp>
-        <p:nvSpPr>
-          <p:cNvPr id="3" name="Content Placeholder 2"/>
-          <p:cNvSpPr>
-            <a:spLocks noGrp="1"/>
-          </p:cNvSpPr>
-          <p:nvPr>
-            <p:ph idx="1"/>
-          </p:nvPr>
-        </p:nvSpPr>
-        <p:spPr>
-          <a:xfrm>
-            <a:off x="684212" y="2215195"/>
-            <a:ext cx="8534400" cy="3615267"/>
-          </a:xfrm>
-        </p:spPr>
-        <p:txBody>
-          <a:bodyPr>
-            <a:normAutofit/>
-          </a:bodyPr>
-          <a:lstStyle/>
-          <a:p>
-            <a:r>
-              <a:rPr lang="en-US" dirty="0" smtClean="0"/>
-              <a:t>Identify </a:t>
-            </a:r>
-            <a:r>
-              <a:rPr lang="en-US" dirty="0"/>
-              <a:t>the target users (10</a:t>
-            </a:r>
-            <a:r>
-              <a:rPr lang="en-US" dirty="0" smtClean="0"/>
-              <a:t>%)</a:t>
-            </a:r>
-          </a:p>
-          <a:p>
-            <a:r>
-              <a:rPr lang="en-US" dirty="0" smtClean="0"/>
-              <a:t>Discuss </a:t>
-            </a:r>
-            <a:r>
-              <a:rPr lang="en-US" dirty="0"/>
-              <a:t>the characteristics of the target </a:t>
-            </a:r>
-            <a:r>
-              <a:rPr lang="en-US" dirty="0" smtClean="0"/>
-              <a:t>users</a:t>
-            </a:r>
-            <a:endParaRPr lang="en-US" dirty="0"/>
-          </a:p>
-        </p:txBody>
-      </p:sp>
+      </p:pic>
     </p:spTree>
     <p:extLst>
       <p:ext uri="{BB962C8B-B14F-4D97-AF65-F5344CB8AC3E}">
-        <p14:creationId xmlns:p14="http://schemas.microsoft.com/office/powerpoint/2010/main" val="1392475990"/>
+        <p14:creationId xmlns:p14="http://schemas.microsoft.com/office/powerpoint/2010/main" val="2928316897"/>
       </p:ext>
     </p:extLst>
   </p:cSld>
@@ -5798,7 +5860,7 @@
           <a:p>
             <a:r>
               <a:rPr lang="en-US" dirty="0" smtClean="0"/>
-              <a:t>features</a:t>
+              <a:t>Audience</a:t>
             </a:r>
             <a:endParaRPr lang="en-AU" dirty="0"/>
           </a:p>
@@ -5832,21 +5894,26 @@
             </a:r>
             <a:r>
               <a:rPr lang="en-US" dirty="0"/>
-              <a:t>the basic features to be implemented </a:t>
-            </a:r>
-          </a:p>
-          <a:p>
+              <a:t>the target </a:t>
+            </a:r>
             <a:r>
               <a:rPr lang="en-US" dirty="0" smtClean="0"/>
-              <a:t>Identify </a:t>
+              <a:t>users</a:t>
+            </a:r>
+            <a:endParaRPr lang="en-US" dirty="0" smtClean="0"/>
+          </a:p>
+          <a:p>
+            <a:r>
+              <a:rPr lang="en-US" dirty="0" smtClean="0"/>
+              <a:t>Discuss </a:t>
             </a:r>
             <a:r>
               <a:rPr lang="en-US" dirty="0"/>
-              <a:t>and discuss features to enhance users </a:t>
+              <a:t>the characteristics of the target </a:t>
             </a:r>
             <a:r>
               <a:rPr lang="en-US" dirty="0" smtClean="0"/>
-              <a:t>experience</a:t>
+              <a:t>users</a:t>
             </a:r>
             <a:endParaRPr lang="en-US" dirty="0"/>
           </a:p>
@@ -5855,7 +5922,7 @@
     </p:spTree>
     <p:extLst>
       <p:ext uri="{BB962C8B-B14F-4D97-AF65-F5344CB8AC3E}">
-        <p14:creationId xmlns:p14="http://schemas.microsoft.com/office/powerpoint/2010/main" val="3023949364"/>
+        <p14:creationId xmlns:p14="http://schemas.microsoft.com/office/powerpoint/2010/main" val="1392475990"/>
       </p:ext>
     </p:extLst>
   </p:cSld>
@@ -5904,7 +5971,7 @@
           <a:p>
             <a:r>
               <a:rPr lang="en-US" dirty="0" smtClean="0"/>
-              <a:t>Technologies</a:t>
+              <a:t>features</a:t>
             </a:r>
             <a:endParaRPr lang="en-AU" dirty="0"/>
           </a:p>
@@ -5938,7 +6005,7 @@
             </a:r>
             <a:r>
               <a:rPr lang="en-US" dirty="0"/>
-              <a:t>the functional &amp; technologies requirements </a:t>
+              <a:t>the basic features to be implemented </a:t>
             </a:r>
           </a:p>
           <a:p>
@@ -5948,15 +6015,20 @@
             </a:r>
             <a:r>
               <a:rPr lang="en-US" dirty="0"/>
-              <a:t>the data requirements </a:t>
-            </a:r>
+              <a:t>and discuss features to enhance users </a:t>
+            </a:r>
+            <a:r>
+              <a:rPr lang="en-US" dirty="0" smtClean="0"/>
+              <a:t>experience</a:t>
+            </a:r>
+            <a:endParaRPr lang="en-US" dirty="0"/>
           </a:p>
         </p:txBody>
       </p:sp>
     </p:spTree>
     <p:extLst>
       <p:ext uri="{BB962C8B-B14F-4D97-AF65-F5344CB8AC3E}">
-        <p14:creationId xmlns:p14="http://schemas.microsoft.com/office/powerpoint/2010/main" val="451716557"/>
+        <p14:creationId xmlns:p14="http://schemas.microsoft.com/office/powerpoint/2010/main" val="3023949364"/>
       </p:ext>
     </p:extLst>
   </p:cSld>
@@ -6005,69 +6077,16 @@
           <a:p>
             <a:r>
               <a:rPr lang="en-US" dirty="0" smtClean="0"/>
-              <a:t>Responsibilities</a:t>
+              <a:t>Sample User Interface</a:t>
             </a:r>
             <a:endParaRPr lang="en-AU" dirty="0"/>
-          </a:p>
-        </p:txBody>
-      </p:sp>
-      <p:sp>
-        <p:nvSpPr>
-          <p:cNvPr id="3" name="Content Placeholder 2"/>
-          <p:cNvSpPr>
-            <a:spLocks noGrp="1"/>
-          </p:cNvSpPr>
-          <p:nvPr>
-            <p:ph idx="1"/>
-          </p:nvPr>
-        </p:nvSpPr>
-        <p:spPr>
-          <a:xfrm>
-            <a:off x="684212" y="2215195"/>
-            <a:ext cx="8534400" cy="3615267"/>
-          </a:xfrm>
-        </p:spPr>
-        <p:txBody>
-          <a:bodyPr>
-            <a:normAutofit/>
-          </a:bodyPr>
-          <a:lstStyle/>
-          <a:p>
-            <a:r>
-              <a:rPr lang="en-US" dirty="0" smtClean="0"/>
-              <a:t>Identify </a:t>
-            </a:r>
-            <a:r>
-              <a:rPr lang="en-US" dirty="0"/>
-              <a:t>the strengths and weaknesses of each </a:t>
-            </a:r>
-            <a:r>
-              <a:rPr lang="en-US" dirty="0" smtClean="0"/>
-              <a:t>member</a:t>
-            </a:r>
-            <a:endParaRPr lang="en-US" dirty="0"/>
-          </a:p>
-          <a:p>
-            <a:r>
-              <a:rPr lang="en-US" dirty="0" smtClean="0"/>
-              <a:t>State </a:t>
-            </a:r>
-            <a:r>
-              <a:rPr lang="en-US" dirty="0"/>
-              <a:t>and justify who in charge of </a:t>
-            </a:r>
-            <a:r>
-              <a:rPr lang="en-US" dirty="0" smtClean="0"/>
-              <a:t>what</a:t>
-            </a:r>
-            <a:endParaRPr lang="en-US" dirty="0"/>
           </a:p>
         </p:txBody>
       </p:sp>
     </p:spTree>
     <p:extLst>
       <p:ext uri="{BB962C8B-B14F-4D97-AF65-F5344CB8AC3E}">
-        <p14:creationId xmlns:p14="http://schemas.microsoft.com/office/powerpoint/2010/main" val="161993207"/>
+        <p14:creationId xmlns:p14="http://schemas.microsoft.com/office/powerpoint/2010/main" val="48083459"/>
       </p:ext>
     </p:extLst>
   </p:cSld>
@@ -6116,7 +6135,7 @@
           <a:p>
             <a:r>
               <a:rPr lang="en-US" dirty="0" smtClean="0"/>
-              <a:t>Schedule</a:t>
+              <a:t>Technologies</a:t>
             </a:r>
             <a:endParaRPr lang="en-AU" dirty="0"/>
           </a:p>
@@ -6150,36 +6169,136 @@
             </a:r>
             <a:r>
               <a:rPr lang="en-US" dirty="0"/>
-              <a:t>the major milestones of the project </a:t>
+              <a:t>the functional &amp; technologies requirements </a:t>
             </a:r>
           </a:p>
           <a:p>
             <a:r>
               <a:rPr lang="en-US" dirty="0" smtClean="0"/>
-              <a:t>Indicate </a:t>
+              <a:t>Identify </a:t>
             </a:r>
             <a:r>
               <a:rPr lang="en-US" dirty="0"/>
-              <a:t>when each milestone should be </a:t>
-            </a:r>
-            <a:r>
-              <a:rPr lang="en-US" dirty="0" smtClean="0"/>
-              <a:t>achieved</a:t>
-            </a:r>
-          </a:p>
-          <a:p>
-            <a:r>
-              <a:rPr lang="en-US" dirty="0" smtClean="0"/>
-              <a:t>Gantt Chart</a:t>
-            </a:r>
-            <a:endParaRPr lang="en-US" dirty="0"/>
+              <a:t>the data requirements </a:t>
+            </a:r>
           </a:p>
         </p:txBody>
       </p:sp>
     </p:spTree>
     <p:extLst>
       <p:ext uri="{BB962C8B-B14F-4D97-AF65-F5344CB8AC3E}">
-        <p14:creationId xmlns:p14="http://schemas.microsoft.com/office/powerpoint/2010/main" val="1030416648"/>
+        <p14:creationId xmlns:p14="http://schemas.microsoft.com/office/powerpoint/2010/main" val="451716557"/>
+      </p:ext>
+    </p:extLst>
+  </p:cSld>
+  <p:clrMapOvr>
+    <a:masterClrMapping/>
+  </p:clrMapOvr>
+</p:sld>
+</file>
+
+<file path=ppt/slides/slide9.xml><?xml version="1.0" encoding="utf-8"?>
+<p:sld xmlns:a="http://schemas.openxmlformats.org/drawingml/2006/main" xmlns:r="http://schemas.openxmlformats.org/officeDocument/2006/relationships" xmlns:p="http://schemas.openxmlformats.org/presentationml/2006/main">
+  <p:cSld>
+    <p:spTree>
+      <p:nvGrpSpPr>
+        <p:cNvPr id="1" name=""/>
+        <p:cNvGrpSpPr/>
+        <p:nvPr/>
+      </p:nvGrpSpPr>
+      <p:grpSpPr>
+        <a:xfrm>
+          <a:off x="0" y="0"/>
+          <a:ext cx="0" cy="0"/>
+          <a:chOff x="0" y="0"/>
+          <a:chExt cx="0" cy="0"/>
+        </a:xfrm>
+      </p:grpSpPr>
+      <p:sp>
+        <p:nvSpPr>
+          <p:cNvPr id="2" name="Title 1"/>
+          <p:cNvSpPr>
+            <a:spLocks noGrp="1"/>
+          </p:cNvSpPr>
+          <p:nvPr>
+            <p:ph type="title"/>
+          </p:nvPr>
+        </p:nvSpPr>
+        <p:spPr>
+          <a:xfrm>
+            <a:off x="684212" y="368486"/>
+            <a:ext cx="8534400" cy="1507067"/>
+          </a:xfrm>
+        </p:spPr>
+        <p:txBody>
+          <a:bodyPr/>
+          <a:lstStyle/>
+          <a:p>
+            <a:r>
+              <a:rPr lang="en-US" dirty="0" smtClean="0"/>
+              <a:t>Responsibilities</a:t>
+            </a:r>
+            <a:endParaRPr lang="en-AU" dirty="0"/>
+          </a:p>
+        </p:txBody>
+      </p:sp>
+      <p:sp>
+        <p:nvSpPr>
+          <p:cNvPr id="3" name="Content Placeholder 2"/>
+          <p:cNvSpPr>
+            <a:spLocks noGrp="1"/>
+          </p:cNvSpPr>
+          <p:nvPr>
+            <p:ph idx="1"/>
+          </p:nvPr>
+        </p:nvSpPr>
+        <p:spPr>
+          <a:xfrm>
+            <a:off x="684212" y="2215195"/>
+            <a:ext cx="8534400" cy="3615267"/>
+          </a:xfrm>
+        </p:spPr>
+        <p:txBody>
+          <a:bodyPr>
+            <a:normAutofit/>
+          </a:bodyPr>
+          <a:lstStyle/>
+          <a:p>
+            <a:r>
+              <a:rPr lang="en-US" dirty="0" smtClean="0"/>
+              <a:t>Identify </a:t>
+            </a:r>
+            <a:r>
+              <a:rPr lang="en-US" dirty="0"/>
+              <a:t>the strengths and weaknesses of each </a:t>
+            </a:r>
+            <a:r>
+              <a:rPr lang="en-US" dirty="0" smtClean="0"/>
+              <a:t>member</a:t>
+            </a:r>
+            <a:endParaRPr lang="en-US" dirty="0"/>
+          </a:p>
+          <a:p>
+            <a:r>
+              <a:rPr lang="en-US" dirty="0" smtClean="0"/>
+              <a:t>State </a:t>
+            </a:r>
+            <a:r>
+              <a:rPr lang="en-US" dirty="0"/>
+              <a:t>and justify who in charge of </a:t>
+            </a:r>
+            <a:r>
+              <a:rPr lang="en-US" dirty="0" smtClean="0"/>
+              <a:t>what</a:t>
+            </a:r>
+            <a:endParaRPr lang="en-US" dirty="0"/>
+          </a:p>
+        </p:txBody>
+      </p:sp>
+    </p:spTree>
+    <p:extLst>
+      <p:ext uri="{BB962C8B-B14F-4D97-AF65-F5344CB8AC3E}">
+        <p14:creationId xmlns:p14="http://schemas.microsoft.com/office/powerpoint/2010/main" val="161993207"/>
       </p:ext>
     </p:extLst>
   </p:cSld>

</xml_diff>

<commit_message>
Continued progress on presentation PowerPoint
</commit_message>
<xml_diff>
--- a/ResourceManagementPresentation.pptx
+++ b/ResourceManagementPresentation.pptx
@@ -5379,8 +5379,23 @@
           <a:p>
             <a:r>
               <a:rPr lang="en-AU" dirty="0"/>
-              <a:t>Xiao Liu</a:t>
-            </a:r>
+              <a:t>Xiao </a:t>
+            </a:r>
+            <a:r>
+              <a:rPr lang="en-AU" dirty="0" smtClean="0"/>
+              <a:t>Liu</a:t>
+            </a:r>
+          </a:p>
+          <a:p>
+            <a:r>
+              <a:rPr lang="en-AU" dirty="0" err="1"/>
+              <a:t>Ruijin</a:t>
+            </a:r>
+            <a:r>
+              <a:rPr lang="en-AU" dirty="0"/>
+              <a:t> Liu</a:t>
+            </a:r>
+            <a:endParaRPr lang="en-AU" dirty="0"/>
           </a:p>
         </p:txBody>
       </p:sp>
@@ -5900,7 +5915,6 @@
               <a:rPr lang="en-US" dirty="0" smtClean="0"/>
               <a:t>users</a:t>
             </a:r>
-            <a:endParaRPr lang="en-US" dirty="0" smtClean="0"/>
           </a:p>
           <a:p>
             <a:r>
@@ -6083,6 +6097,46 @@
           </a:p>
         </p:txBody>
       </p:sp>
+      <p:sp>
+        <p:nvSpPr>
+          <p:cNvPr id="3" name="Rectangle 2"/>
+          <p:cNvSpPr/>
+          <p:nvPr/>
+        </p:nvSpPr>
+        <p:spPr>
+          <a:xfrm>
+            <a:off x="2921225" y="1875553"/>
+            <a:ext cx="5882909" cy="1173345"/>
+          </a:xfrm>
+          <a:prstGeom prst="rect">
+            <a:avLst/>
+          </a:prstGeom>
+        </p:spPr>
+        <p:style>
+          <a:lnRef idx="2">
+            <a:schemeClr val="accent1">
+              <a:shade val="50000"/>
+            </a:schemeClr>
+          </a:lnRef>
+          <a:fillRef idx="1">
+            <a:schemeClr val="accent1"/>
+          </a:fillRef>
+          <a:effectRef idx="0">
+            <a:schemeClr val="accent1"/>
+          </a:effectRef>
+          <a:fontRef idx="minor">
+            <a:schemeClr val="lt1"/>
+          </a:fontRef>
+        </p:style>
+        <p:txBody>
+          <a:bodyPr rtlCol="0" anchor="ctr"/>
+          <a:lstStyle/>
+          <a:p>
+            <a:pPr algn="ctr"/>
+            <a:endParaRPr lang="en-AU"/>
+          </a:p>
+        </p:txBody>
+      </p:sp>
     </p:spTree>
     <p:extLst>
       <p:ext uri="{BB962C8B-B14F-4D97-AF65-F5344CB8AC3E}">
@@ -6242,59 +6296,515 @@
           </a:p>
         </p:txBody>
       </p:sp>
-      <p:sp>
-        <p:nvSpPr>
-          <p:cNvPr id="3" name="Content Placeholder 2"/>
-          <p:cNvSpPr>
-            <a:spLocks noGrp="1"/>
-          </p:cNvSpPr>
-          <p:nvPr>
-            <p:ph idx="1"/>
-          </p:nvPr>
-        </p:nvSpPr>
-        <p:spPr>
-          <a:xfrm>
-            <a:off x="684212" y="2215195"/>
-            <a:ext cx="8534400" cy="3615267"/>
-          </a:xfrm>
-        </p:spPr>
-        <p:txBody>
-          <a:bodyPr>
-            <a:normAutofit/>
-          </a:bodyPr>
-          <a:lstStyle/>
-          <a:p>
-            <a:r>
-              <a:rPr lang="en-US" dirty="0" smtClean="0"/>
-              <a:t>Identify </a:t>
-            </a:r>
-            <a:r>
-              <a:rPr lang="en-US" dirty="0"/>
-              <a:t>the strengths and weaknesses of each </a:t>
-            </a:r>
-            <a:r>
-              <a:rPr lang="en-US" dirty="0" smtClean="0"/>
-              <a:t>member</a:t>
-            </a:r>
-            <a:endParaRPr lang="en-US" dirty="0"/>
-          </a:p>
-          <a:p>
-            <a:r>
-              <a:rPr lang="en-US" dirty="0" smtClean="0"/>
-              <a:t>State </a:t>
-            </a:r>
-            <a:r>
-              <a:rPr lang="en-US" dirty="0"/>
-              <a:t>and justify who in charge of </a:t>
-            </a:r>
-            <a:r>
-              <a:rPr lang="en-US" dirty="0" smtClean="0"/>
-              <a:t>what</a:t>
-            </a:r>
-            <a:endParaRPr lang="en-US" dirty="0"/>
-          </a:p>
-        </p:txBody>
-      </p:sp>
+      <p:graphicFrame>
+        <p:nvGraphicFramePr>
+          <p:cNvPr id="4" name="Table 3"/>
+          <p:cNvGraphicFramePr>
+            <a:graphicFrameLocks noGrp="1"/>
+          </p:cNvGraphicFramePr>
+          <p:nvPr>
+            <p:extLst>
+              <p:ext uri="{D42A27DB-BD31-4B8C-83A1-F6EECF244321}">
+                <p14:modId xmlns:p14="http://schemas.microsoft.com/office/powerpoint/2010/main" val="1112534003"/>
+              </p:ext>
+            </p:extLst>
+          </p:nvPr>
+        </p:nvGraphicFramePr>
+        <p:xfrm>
+          <a:off x="412691" y="1634066"/>
+          <a:ext cx="10916158" cy="4058920"/>
+        </p:xfrm>
+        <a:graphic>
+          <a:graphicData uri="http://schemas.openxmlformats.org/drawingml/2006/table">
+            <a:tbl>
+              <a:tblPr firstRow="1" bandRow="1">
+                <a:tableStyleId>{5C22544A-7EE6-4342-B048-85BDC9FD1C3A}</a:tableStyleId>
+              </a:tblPr>
+              <a:tblGrid>
+                <a:gridCol w="1569858"/>
+                <a:gridCol w="2097627"/>
+                <a:gridCol w="2323185"/>
+                <a:gridCol w="2643572"/>
+                <a:gridCol w="2281916"/>
+              </a:tblGrid>
+              <a:tr h="370840">
+                <a:tc>
+                  <a:txBody>
+                    <a:bodyPr/>
+                    <a:lstStyle/>
+                    <a:p>
+                      <a:endParaRPr lang="en-AU" dirty="0"/>
+                    </a:p>
+                  </a:txBody>
+                  <a:tcPr/>
+                </a:tc>
+                <a:tc>
+                  <a:txBody>
+                    <a:bodyPr/>
+                    <a:lstStyle/>
+                    <a:p>
+                      <a:r>
+                        <a:rPr lang="en-US" dirty="0" smtClean="0"/>
+                        <a:t>Doug</a:t>
+                      </a:r>
+                      <a:endParaRPr lang="en-AU" dirty="0"/>
+                    </a:p>
+                  </a:txBody>
+                  <a:tcPr/>
+                </a:tc>
+                <a:tc>
+                  <a:txBody>
+                    <a:bodyPr/>
+                    <a:lstStyle/>
+                    <a:p>
+                      <a:r>
+                        <a:rPr lang="en-US" dirty="0" smtClean="0"/>
+                        <a:t>Sam</a:t>
+                      </a:r>
+                      <a:endParaRPr lang="en-AU" dirty="0"/>
+                    </a:p>
+                  </a:txBody>
+                  <a:tcPr/>
+                </a:tc>
+                <a:tc>
+                  <a:txBody>
+                    <a:bodyPr/>
+                    <a:lstStyle/>
+                    <a:p>
+                      <a:r>
+                        <a:rPr lang="en-AU" dirty="0" smtClean="0"/>
+                        <a:t>Xiao</a:t>
+                      </a:r>
+                      <a:endParaRPr lang="en-AU" dirty="0"/>
+                    </a:p>
+                  </a:txBody>
+                  <a:tcPr/>
+                </a:tc>
+                <a:tc>
+                  <a:txBody>
+                    <a:bodyPr/>
+                    <a:lstStyle/>
+                    <a:p>
+                      <a:r>
+                        <a:rPr lang="en-AU" dirty="0" err="1" smtClean="0"/>
+                        <a:t>Ruijin</a:t>
+                      </a:r>
+                      <a:endParaRPr lang="en-AU" dirty="0"/>
+                    </a:p>
+                  </a:txBody>
+                  <a:tcPr/>
+                </a:tc>
+              </a:tr>
+              <a:tr h="370840">
+                <a:tc>
+                  <a:txBody>
+                    <a:bodyPr/>
+                    <a:lstStyle/>
+                    <a:p>
+                      <a:r>
+                        <a:rPr lang="en-US" dirty="0" smtClean="0"/>
+                        <a:t>Primary Roles</a:t>
+                      </a:r>
+                      <a:endParaRPr lang="en-AU" dirty="0"/>
+                    </a:p>
+                  </a:txBody>
+                  <a:tcPr/>
+                </a:tc>
+                <a:tc>
+                  <a:txBody>
+                    <a:bodyPr/>
+                    <a:lstStyle/>
+                    <a:p>
+                      <a:pPr marL="285750" indent="-285750">
+                        <a:buFont typeface="Arial" panose="020B0604020202020204" pitchFamily="34" charset="0"/>
+                        <a:buChar char="•"/>
+                      </a:pPr>
+                      <a:r>
+                        <a:rPr lang="en-US" sz="1600" dirty="0" smtClean="0"/>
+                        <a:t>Backend</a:t>
+                      </a:r>
+                      <a:r>
+                        <a:rPr lang="en-US" sz="1600" baseline="0" dirty="0" smtClean="0"/>
+                        <a:t> Development</a:t>
+                      </a:r>
+                    </a:p>
+                    <a:p>
+                      <a:pPr marL="0" indent="0">
+                        <a:buFont typeface="Arial" panose="020B0604020202020204" pitchFamily="34" charset="0"/>
+                        <a:buNone/>
+                      </a:pPr>
+                      <a:endParaRPr lang="en-US" sz="1600" baseline="0" dirty="0" smtClean="0"/>
+                    </a:p>
+                    <a:p>
+                      <a:pPr marL="285750" indent="-285750">
+                        <a:buFont typeface="Arial" panose="020B0604020202020204" pitchFamily="34" charset="0"/>
+                        <a:buChar char="•"/>
+                      </a:pPr>
+                      <a:r>
+                        <a:rPr lang="en-US" sz="1600" baseline="0" dirty="0" smtClean="0"/>
+                        <a:t>Database Admin</a:t>
+                      </a:r>
+                      <a:endParaRPr lang="en-US" sz="1600" dirty="0" smtClean="0"/>
+                    </a:p>
+                    <a:p>
+                      <a:pPr marL="285750" indent="-285750">
+                        <a:buFont typeface="Arial" panose="020B0604020202020204" pitchFamily="34" charset="0"/>
+                        <a:buChar char="•"/>
+                      </a:pPr>
+                      <a:endParaRPr lang="en-AU" sz="1600" dirty="0"/>
+                    </a:p>
+                  </a:txBody>
+                  <a:tcPr/>
+                </a:tc>
+                <a:tc>
+                  <a:txBody>
+                    <a:bodyPr/>
+                    <a:lstStyle/>
+                    <a:p>
+                      <a:pPr marL="285750" indent="-285750">
+                        <a:buFont typeface="Arial" panose="020B0604020202020204" pitchFamily="34" charset="0"/>
+                        <a:buChar char="•"/>
+                      </a:pPr>
+                      <a:r>
+                        <a:rPr lang="en-US" sz="1600" baseline="0" dirty="0" smtClean="0"/>
+                        <a:t>Backend-Frontend API Management</a:t>
+                      </a:r>
+                      <a:endParaRPr lang="en-AU" sz="1600" dirty="0"/>
+                    </a:p>
+                  </a:txBody>
+                  <a:tcPr/>
+                </a:tc>
+                <a:tc>
+                  <a:txBody>
+                    <a:bodyPr/>
+                    <a:lstStyle/>
+                    <a:p>
+                      <a:pPr marL="285750" indent="-285750">
+                        <a:buFont typeface="Arial" panose="020B0604020202020204" pitchFamily="34" charset="0"/>
+                        <a:buChar char="•"/>
+                      </a:pPr>
+                      <a:r>
+                        <a:rPr lang="en-US" sz="1600" dirty="0" smtClean="0"/>
+                        <a:t>Frontend Design</a:t>
+                      </a:r>
+                    </a:p>
+                    <a:p>
+                      <a:pPr marL="0" indent="0">
+                        <a:buFont typeface="Arial" panose="020B0604020202020204" pitchFamily="34" charset="0"/>
+                        <a:buNone/>
+                      </a:pPr>
+                      <a:endParaRPr lang="en-US" sz="1600" dirty="0" smtClean="0"/>
+                    </a:p>
+                    <a:p>
+                      <a:pPr marL="285750" indent="-285750">
+                        <a:buFont typeface="Arial" panose="020B0604020202020204" pitchFamily="34" charset="0"/>
+                        <a:buChar char="•"/>
+                      </a:pPr>
+                      <a:r>
+                        <a:rPr lang="en-US" sz="1600" dirty="0" smtClean="0"/>
+                        <a:t>Graphic</a:t>
+                      </a:r>
+                      <a:r>
+                        <a:rPr lang="en-US" sz="1600" baseline="0" dirty="0" smtClean="0"/>
+                        <a:t> Interface Design</a:t>
+                      </a:r>
+                      <a:endParaRPr lang="en-AU" sz="1600" dirty="0"/>
+                    </a:p>
+                  </a:txBody>
+                  <a:tcPr/>
+                </a:tc>
+                <a:tc>
+                  <a:txBody>
+                    <a:bodyPr/>
+                    <a:lstStyle/>
+                    <a:p>
+                      <a:pPr marL="285750" indent="-285750">
+                        <a:buFont typeface="Arial" panose="020B0604020202020204" pitchFamily="34" charset="0"/>
+                        <a:buChar char="•"/>
+                      </a:pPr>
+                      <a:r>
+                        <a:rPr lang="en-US" sz="1600" dirty="0" smtClean="0"/>
+                        <a:t>Frontend</a:t>
+                      </a:r>
+                      <a:r>
+                        <a:rPr lang="en-US" sz="1600" baseline="0" dirty="0" smtClean="0"/>
+                        <a:t> Development</a:t>
+                      </a:r>
+                    </a:p>
+                    <a:p>
+                      <a:pPr marL="0" indent="0">
+                        <a:buFont typeface="Arial" panose="020B0604020202020204" pitchFamily="34" charset="0"/>
+                        <a:buNone/>
+                      </a:pPr>
+                      <a:endParaRPr lang="en-US" sz="1600" baseline="0" dirty="0" smtClean="0"/>
+                    </a:p>
+                    <a:p>
+                      <a:pPr marL="285750" indent="-285750">
+                        <a:buFont typeface="Arial" panose="020B0604020202020204" pitchFamily="34" charset="0"/>
+                        <a:buChar char="•"/>
+                      </a:pPr>
+                      <a:r>
+                        <a:rPr lang="en-US" sz="1600" baseline="0" dirty="0" smtClean="0"/>
+                        <a:t>User Interface</a:t>
+                      </a:r>
+                      <a:endParaRPr lang="en-AU" sz="1600" dirty="0"/>
+                    </a:p>
+                  </a:txBody>
+                  <a:tcPr/>
+                </a:tc>
+              </a:tr>
+              <a:tr h="370840">
+                <a:tc>
+                  <a:txBody>
+                    <a:bodyPr/>
+                    <a:lstStyle/>
+                    <a:p>
+                      <a:r>
+                        <a:rPr lang="en-US" dirty="0" smtClean="0"/>
+                        <a:t>Strengths</a:t>
+                      </a:r>
+                      <a:endParaRPr lang="en-AU" dirty="0"/>
+                    </a:p>
+                  </a:txBody>
+                  <a:tcPr/>
+                </a:tc>
+                <a:tc>
+                  <a:txBody>
+                    <a:bodyPr/>
+                    <a:lstStyle/>
+                    <a:p>
+                      <a:pPr marL="285750" indent="-285750">
+                        <a:buFont typeface="Arial" panose="020B0604020202020204" pitchFamily="34" charset="0"/>
+                        <a:buChar char="•"/>
+                      </a:pPr>
+                      <a:r>
+                        <a:rPr lang="en-US" sz="1600" dirty="0" err="1" smtClean="0"/>
+                        <a:t>NodeJS</a:t>
+                      </a:r>
+                      <a:endParaRPr lang="en-US" sz="1600" dirty="0" smtClean="0"/>
+                    </a:p>
+                    <a:p>
+                      <a:pPr marL="0" indent="0">
+                        <a:buFont typeface="Arial" panose="020B0604020202020204" pitchFamily="34" charset="0"/>
+                        <a:buNone/>
+                      </a:pPr>
+                      <a:endParaRPr lang="en-US" sz="1600" dirty="0" smtClean="0"/>
+                    </a:p>
+                    <a:p>
+                      <a:pPr marL="285750" indent="-285750">
+                        <a:buFont typeface="Arial" panose="020B0604020202020204" pitchFamily="34" charset="0"/>
+                        <a:buChar char="•"/>
+                      </a:pPr>
+                      <a:r>
+                        <a:rPr lang="en-US" sz="1600" dirty="0" smtClean="0"/>
+                        <a:t>Database / Schema</a:t>
+                      </a:r>
+                      <a:r>
+                        <a:rPr lang="en-US" sz="1600" baseline="0" dirty="0" smtClean="0"/>
+                        <a:t> Design</a:t>
+                      </a:r>
+                      <a:endParaRPr lang="en-AU" sz="1600" dirty="0"/>
+                    </a:p>
+                  </a:txBody>
+                  <a:tcPr/>
+                </a:tc>
+                <a:tc>
+                  <a:txBody>
+                    <a:bodyPr/>
+                    <a:lstStyle/>
+                    <a:p>
+                      <a:pPr marL="285750" indent="-285750">
+                        <a:buFont typeface="Arial" panose="020B0604020202020204" pitchFamily="34" charset="0"/>
+                        <a:buChar char="•"/>
+                      </a:pPr>
+                      <a:r>
+                        <a:rPr lang="en-US" sz="1600" dirty="0" smtClean="0"/>
+                        <a:t>JavaScript/HTML integration</a:t>
+                      </a:r>
+                      <a:endParaRPr lang="en-AU" sz="1600" dirty="0"/>
+                    </a:p>
+                  </a:txBody>
+                  <a:tcPr/>
+                </a:tc>
+                <a:tc>
+                  <a:txBody>
+                    <a:bodyPr/>
+                    <a:lstStyle/>
+                    <a:p>
+                      <a:pPr marL="285750" indent="-285750">
+                        <a:buFont typeface="Arial" panose="020B0604020202020204" pitchFamily="34" charset="0"/>
+                        <a:buChar char="•"/>
+                      </a:pPr>
+                      <a:r>
+                        <a:rPr lang="en-US" sz="1600" dirty="0" smtClean="0"/>
+                        <a:t>CSS</a:t>
+                      </a:r>
+                    </a:p>
+                    <a:p>
+                      <a:pPr marL="0" indent="0">
+                        <a:buFont typeface="Arial" panose="020B0604020202020204" pitchFamily="34" charset="0"/>
+                        <a:buNone/>
+                      </a:pPr>
+                      <a:endParaRPr lang="en-US" sz="1600" dirty="0" smtClean="0"/>
+                    </a:p>
+                    <a:p>
+                      <a:pPr marL="285750" indent="-285750">
+                        <a:buFont typeface="Arial" panose="020B0604020202020204" pitchFamily="34" charset="0"/>
+                        <a:buChar char="•"/>
+                      </a:pPr>
+                      <a:r>
+                        <a:rPr lang="en-US" sz="1600" dirty="0" smtClean="0"/>
+                        <a:t>Graphics Creation</a:t>
+                      </a:r>
+                      <a:endParaRPr lang="en-AU" sz="1600" dirty="0" smtClean="0"/>
+                    </a:p>
+                    <a:p>
+                      <a:pPr marL="285750" indent="-285750">
+                        <a:buFont typeface="Arial" panose="020B0604020202020204" pitchFamily="34" charset="0"/>
+                        <a:buChar char="•"/>
+                      </a:pPr>
+                      <a:endParaRPr lang="en-AU" sz="1600" dirty="0"/>
+                    </a:p>
+                  </a:txBody>
+                  <a:tcPr/>
+                </a:tc>
+                <a:tc>
+                  <a:txBody>
+                    <a:bodyPr/>
+                    <a:lstStyle/>
+                    <a:p>
+                      <a:pPr marL="285750" indent="-285750">
+                        <a:buFont typeface="Arial" panose="020B0604020202020204" pitchFamily="34" charset="0"/>
+                        <a:buChar char="•"/>
+                      </a:pPr>
+                      <a:endParaRPr lang="en-AU" sz="1600" dirty="0"/>
+                    </a:p>
+                  </a:txBody>
+                  <a:tcPr/>
+                </a:tc>
+              </a:tr>
+              <a:tr h="370840">
+                <a:tc>
+                  <a:txBody>
+                    <a:bodyPr/>
+                    <a:lstStyle/>
+                    <a:p>
+                      <a:r>
+                        <a:rPr lang="en-US" dirty="0" smtClean="0"/>
+                        <a:t>Weaknesses</a:t>
+                      </a:r>
+                      <a:endParaRPr lang="en-AU" dirty="0"/>
+                    </a:p>
+                  </a:txBody>
+                  <a:tcPr/>
+                </a:tc>
+                <a:tc>
+                  <a:txBody>
+                    <a:bodyPr/>
+                    <a:lstStyle/>
+                    <a:p>
+                      <a:pPr marL="285750" indent="-285750">
+                        <a:buFont typeface="Arial" panose="020B0604020202020204" pitchFamily="34" charset="0"/>
+                        <a:buChar char="•"/>
+                      </a:pPr>
+                      <a:r>
+                        <a:rPr lang="en-US" sz="1600" dirty="0" smtClean="0"/>
+                        <a:t>Graphical Design</a:t>
+                      </a:r>
+                    </a:p>
+                    <a:p>
+                      <a:pPr marL="0" indent="0">
+                        <a:buFont typeface="Arial" panose="020B0604020202020204" pitchFamily="34" charset="0"/>
+                        <a:buNone/>
+                      </a:pPr>
+                      <a:endParaRPr lang="en-US" sz="1600" baseline="0" dirty="0" smtClean="0"/>
+                    </a:p>
+                    <a:p>
+                      <a:pPr marL="285750" indent="-285750">
+                        <a:buFont typeface="Arial" panose="020B0604020202020204" pitchFamily="34" charset="0"/>
+                        <a:buChar char="•"/>
+                      </a:pPr>
+                      <a:r>
+                        <a:rPr lang="en-US" sz="1600" baseline="0" dirty="0" smtClean="0"/>
+                        <a:t>CSS</a:t>
+                      </a:r>
+                      <a:endParaRPr lang="en-AU" sz="1600" dirty="0"/>
+                    </a:p>
+                  </a:txBody>
+                  <a:tcPr/>
+                </a:tc>
+                <a:tc>
+                  <a:txBody>
+                    <a:bodyPr/>
+                    <a:lstStyle/>
+                    <a:p>
+                      <a:pPr marL="285750" indent="-285750">
+                        <a:buFont typeface="Arial" panose="020B0604020202020204" pitchFamily="34" charset="0"/>
+                        <a:buChar char="•"/>
+                      </a:pPr>
+                      <a:r>
+                        <a:rPr lang="en-US" sz="1600" dirty="0" smtClean="0"/>
+                        <a:t>Server-side development</a:t>
+                      </a:r>
+                      <a:endParaRPr lang="en-AU" sz="1600" dirty="0"/>
+                    </a:p>
+                  </a:txBody>
+                  <a:tcPr/>
+                </a:tc>
+                <a:tc>
+                  <a:txBody>
+                    <a:bodyPr/>
+                    <a:lstStyle/>
+                    <a:p>
+                      <a:pPr marL="285750" indent="-285750">
+                        <a:buFont typeface="Arial" panose="020B0604020202020204" pitchFamily="34" charset="0"/>
+                        <a:buChar char="•"/>
+                      </a:pPr>
+                      <a:r>
+                        <a:rPr lang="en-US" sz="1600" dirty="0" smtClean="0"/>
+                        <a:t>Coding</a:t>
+                      </a:r>
+                    </a:p>
+                    <a:p>
+                      <a:pPr marL="285750" indent="-285750">
+                        <a:buFont typeface="Arial" panose="020B0604020202020204" pitchFamily="34" charset="0"/>
+                        <a:buChar char="•"/>
+                      </a:pPr>
+                      <a:endParaRPr lang="en-US" sz="1600" dirty="0" smtClean="0"/>
+                    </a:p>
+                    <a:p>
+                      <a:pPr marL="285750" indent="-285750">
+                        <a:buFont typeface="Arial" panose="020B0604020202020204" pitchFamily="34" charset="0"/>
+                        <a:buChar char="•"/>
+                      </a:pPr>
+                      <a:r>
+                        <a:rPr lang="en-US" sz="1600" dirty="0" smtClean="0"/>
+                        <a:t>English</a:t>
+                      </a:r>
+                      <a:endParaRPr lang="en-AU" sz="1600" dirty="0"/>
+                    </a:p>
+                  </a:txBody>
+                  <a:tcPr/>
+                </a:tc>
+                <a:tc>
+                  <a:txBody>
+                    <a:bodyPr/>
+                    <a:lstStyle/>
+                    <a:p>
+                      <a:pPr marL="285750" indent="-285750">
+                        <a:buFont typeface="Arial" panose="020B0604020202020204" pitchFamily="34" charset="0"/>
+                        <a:buChar char="•"/>
+                      </a:pPr>
+                      <a:endParaRPr lang="en-AU" sz="1600" dirty="0"/>
+                    </a:p>
+                  </a:txBody>
+                  <a:tcPr/>
+                </a:tc>
+              </a:tr>
+            </a:tbl>
+          </a:graphicData>
+        </a:graphic>
+      </p:graphicFrame>
     </p:spTree>
     <p:extLst>
       <p:ext uri="{BB962C8B-B14F-4D97-AF65-F5344CB8AC3E}">

</xml_diff>